<commit_message>
Diagrama 3.0 e sprint
</commit_message>
<xml_diff>
--- a/Sprints/Sprint_006 da equipe.pptx
+++ b/Sprints/Sprint_006 da equipe.pptx
@@ -3954,7 +3954,7 @@
             </a:r>
             <a:r>
               <a:rPr lang="pt-BR" dirty="0"/>
-              <a:t>: Adicionar fornecedor, gerar relatórios(todos, só entrada ou só saída).</a:t>
+              <a:t>: Adicionar fornecedor, gerar relatórios (todos, só entrada ou só saída).</a:t>
             </a:r>
           </a:p>
           <a:p>
@@ -4155,6 +4155,25 @@
             <a:r>
               <a:rPr lang="pt-BR" dirty="0"/>
               <a:t>: Corrigir erros, melhorar os códigos.</a:t>
+            </a:r>
+          </a:p>
+          <a:p>
+            <a:pPr algn="just"/>
+            <a:r>
+              <a:rPr lang="pt-BR" b="1" dirty="0"/>
+              <a:t>Status: [</a:t>
+            </a:r>
+            <a:r>
+              <a:rPr lang="pt-BR" dirty="0"/>
+              <a:t>Em andamento</a:t>
+            </a:r>
+            <a:r>
+              <a:rPr lang="pt-BR" b="1" dirty="0"/>
+              <a:t>]</a:t>
+            </a:r>
+            <a:r>
+              <a:rPr lang="pt-BR" dirty="0"/>
+              <a:t>.</a:t>
             </a:r>
           </a:p>
         </p:txBody>

</xml_diff>